<commit_message>
update presentation slide, create eval function and link of report.
Update presentation (missing result and lesson learn)
create eval for later use
modifed readme to include the link to project report.
</commit_message>
<xml_diff>
--- a/project presentation (WIP).pptx
+++ b/project presentation (WIP).pptx
@@ -108,6 +108,11 @@
       </a:defRPr>
     </a:lvl9pPr>
   </p:defaultTextStyle>
+  <p:extLst>
+    <p:ext uri="{EFAFB233-063F-42B5-8137-9DF3F51BA10A}">
+      <p15:sldGuideLst xmlns:p15="http://schemas.microsoft.com/office/powerpoint/2012/main"/>
+    </p:ext>
+  </p:extLst>
 </p:presentation>
 </file>
 
@@ -260,7 +265,7 @@
           <a:p>
             <a:fld id="{9B69D876-7CEC-4B74-B665-6B1E45D3CD13}" type="datetimeFigureOut">
               <a:rPr lang="en-US" smtClean="0"/>
-              <a:t>11/14/2022</a:t>
+              <a:t>11/16/2022</a:t>
             </a:fld>
             <a:endParaRPr lang="en-US"/>
           </a:p>
@@ -460,7 +465,7 @@
           <a:p>
             <a:fld id="{9B69D876-7CEC-4B74-B665-6B1E45D3CD13}" type="datetimeFigureOut">
               <a:rPr lang="en-US" smtClean="0"/>
-              <a:t>11/14/2022</a:t>
+              <a:t>11/16/2022</a:t>
             </a:fld>
             <a:endParaRPr lang="en-US"/>
           </a:p>
@@ -670,7 +675,7 @@
           <a:p>
             <a:fld id="{9B69D876-7CEC-4B74-B665-6B1E45D3CD13}" type="datetimeFigureOut">
               <a:rPr lang="en-US" smtClean="0"/>
-              <a:t>11/14/2022</a:t>
+              <a:t>11/16/2022</a:t>
             </a:fld>
             <a:endParaRPr lang="en-US"/>
           </a:p>
@@ -870,7 +875,7 @@
           <a:p>
             <a:fld id="{9B69D876-7CEC-4B74-B665-6B1E45D3CD13}" type="datetimeFigureOut">
               <a:rPr lang="en-US" smtClean="0"/>
-              <a:t>11/14/2022</a:t>
+              <a:t>11/16/2022</a:t>
             </a:fld>
             <a:endParaRPr lang="en-US"/>
           </a:p>
@@ -1146,7 +1151,7 @@
           <a:p>
             <a:fld id="{9B69D876-7CEC-4B74-B665-6B1E45D3CD13}" type="datetimeFigureOut">
               <a:rPr lang="en-US" smtClean="0"/>
-              <a:t>11/14/2022</a:t>
+              <a:t>11/16/2022</a:t>
             </a:fld>
             <a:endParaRPr lang="en-US"/>
           </a:p>
@@ -1414,7 +1419,7 @@
           <a:p>
             <a:fld id="{9B69D876-7CEC-4B74-B665-6B1E45D3CD13}" type="datetimeFigureOut">
               <a:rPr lang="en-US" smtClean="0"/>
-              <a:t>11/14/2022</a:t>
+              <a:t>11/16/2022</a:t>
             </a:fld>
             <a:endParaRPr lang="en-US"/>
           </a:p>
@@ -1829,7 +1834,7 @@
           <a:p>
             <a:fld id="{9B69D876-7CEC-4B74-B665-6B1E45D3CD13}" type="datetimeFigureOut">
               <a:rPr lang="en-US" smtClean="0"/>
-              <a:t>11/14/2022</a:t>
+              <a:t>11/16/2022</a:t>
             </a:fld>
             <a:endParaRPr lang="en-US"/>
           </a:p>
@@ -1971,7 +1976,7 @@
           <a:p>
             <a:fld id="{9B69D876-7CEC-4B74-B665-6B1E45D3CD13}" type="datetimeFigureOut">
               <a:rPr lang="en-US" smtClean="0"/>
-              <a:t>11/14/2022</a:t>
+              <a:t>11/16/2022</a:t>
             </a:fld>
             <a:endParaRPr lang="en-US"/>
           </a:p>
@@ -2084,7 +2089,7 @@
           <a:p>
             <a:fld id="{9B69D876-7CEC-4B74-B665-6B1E45D3CD13}" type="datetimeFigureOut">
               <a:rPr lang="en-US" smtClean="0"/>
-              <a:t>11/14/2022</a:t>
+              <a:t>11/16/2022</a:t>
             </a:fld>
             <a:endParaRPr lang="en-US"/>
           </a:p>
@@ -2397,7 +2402,7 @@
           <a:p>
             <a:fld id="{9B69D876-7CEC-4B74-B665-6B1E45D3CD13}" type="datetimeFigureOut">
               <a:rPr lang="en-US" smtClean="0"/>
-              <a:t>11/14/2022</a:t>
+              <a:t>11/16/2022</a:t>
             </a:fld>
             <a:endParaRPr lang="en-US"/>
           </a:p>
@@ -2686,7 +2691,7 @@
           <a:p>
             <a:fld id="{9B69D876-7CEC-4B74-B665-6B1E45D3CD13}" type="datetimeFigureOut">
               <a:rPr lang="en-US" smtClean="0"/>
-              <a:t>11/14/2022</a:t>
+              <a:t>11/16/2022</a:t>
             </a:fld>
             <a:endParaRPr lang="en-US"/>
           </a:p>
@@ -2929,7 +2934,7 @@
           <a:p>
             <a:fld id="{9B69D876-7CEC-4B74-B665-6B1E45D3CD13}" type="datetimeFigureOut">
               <a:rPr lang="en-US" smtClean="0"/>
-              <a:t>11/14/2022</a:t>
+              <a:t>11/16/2022</a:t>
             </a:fld>
             <a:endParaRPr lang="en-US"/>
           </a:p>
@@ -3480,12 +3485,61 @@
           <a:chExt cx="0" cy="0"/>
         </a:xfrm>
       </p:grpSpPr>
+      <p:sp>
+        <p:nvSpPr>
+          <p:cNvPr id="6" name="文本框 5">
+            <a:extLst>
+              <a:ext uri="{FF2B5EF4-FFF2-40B4-BE49-F238E27FC236}">
+                <a16:creationId xmlns:a16="http://schemas.microsoft.com/office/drawing/2014/main" id="{BE6ABE3B-BF89-DCE7-A13D-D36714EDD365}"/>
+              </a:ext>
+            </a:extLst>
+          </p:cNvPr>
+          <p:cNvSpPr txBox="1"/>
+          <p:nvPr/>
+        </p:nvSpPr>
+        <p:spPr>
+          <a:xfrm>
+            <a:off x="81452" y="343700"/>
+            <a:ext cx="5632568" cy="646331"/>
+          </a:xfrm>
+          <a:prstGeom prst="rect">
+            <a:avLst/>
+          </a:prstGeom>
+          <a:noFill/>
+        </p:spPr>
+        <p:txBody>
+          <a:bodyPr wrap="none" rtlCol="0">
+            <a:spAutoFit/>
+          </a:bodyPr>
+          <a:lstStyle/>
+          <a:p>
+            <a:r>
+              <a:rPr lang="en-US" dirty="0"/>
+              <a:t>At first we will use </a:t>
+            </a:r>
+            <a:r>
+              <a:rPr lang="en-US" dirty="0" err="1"/>
+              <a:t>Fdataset</a:t>
+            </a:r>
+            <a:r>
+              <a:rPr lang="en-US" dirty="0"/>
+              <a:t> to process the image and text.</a:t>
+            </a:r>
+          </a:p>
+          <a:p>
+            <a:r>
+              <a:rPr lang="en-US" dirty="0"/>
+              <a:t>Later the exist data will be split and load into 2 set</a:t>
+            </a:r>
+          </a:p>
+        </p:txBody>
+      </p:sp>
       <p:pic>
         <p:nvPicPr>
-          <p:cNvPr id="5" name="图片 4" descr="图示&#10;&#10;描述已自动生成">
-            <a:extLst>
-              <a:ext uri="{FF2B5EF4-FFF2-40B4-BE49-F238E27FC236}">
-                <a16:creationId xmlns:a16="http://schemas.microsoft.com/office/drawing/2014/main" id="{6B5C2926-9ADE-2FA0-AFBA-AB3F10F02743}"/>
+          <p:cNvPr id="4" name="图片 3">
+            <a:extLst>
+              <a:ext uri="{FF2B5EF4-FFF2-40B4-BE49-F238E27FC236}">
+                <a16:creationId xmlns:a16="http://schemas.microsoft.com/office/drawing/2014/main" id="{E53164F5-EDF2-D5C6-8928-577FB5A6C633}"/>
               </a:ext>
             </a:extLst>
           </p:cNvPr>
@@ -3494,21 +3548,16 @@
           </p:cNvPicPr>
           <p:nvPr/>
         </p:nvPicPr>
-        <p:blipFill rotWithShape="1">
-          <a:blip r:embed="rId2">
-            <a:extLst>
-              <a:ext uri="{28A0092B-C50C-407E-A947-70E740481C1C}">
-                <a14:useLocalDpi xmlns:a14="http://schemas.microsoft.com/office/drawing/2010/main" val="0"/>
-              </a:ext>
-            </a:extLst>
-          </a:blip>
-          <a:srcRect l="3945" t="8783" r="8825" b="3280"/>
-          <a:stretch/>
+        <p:blipFill>
+          <a:blip r:embed="rId2"/>
+          <a:stretch>
+            <a:fillRect/>
+          </a:stretch>
         </p:blipFill>
         <p:spPr>
           <a:xfrm>
-            <a:off x="596106" y="95137"/>
-            <a:ext cx="6340475" cy="4465200"/>
+            <a:off x="276265" y="1267126"/>
+            <a:ext cx="7674744" cy="5409390"/>
           </a:xfrm>
           <a:prstGeom prst="rect">
             <a:avLst/>
@@ -3517,10 +3566,10 @@
       </p:pic>
       <p:sp>
         <p:nvSpPr>
-          <p:cNvPr id="6" name="文本框 5">
-            <a:extLst>
-              <a:ext uri="{FF2B5EF4-FFF2-40B4-BE49-F238E27FC236}">
-                <a16:creationId xmlns:a16="http://schemas.microsoft.com/office/drawing/2014/main" id="{BE6ABE3B-BF89-DCE7-A13D-D36714EDD365}"/>
+          <p:cNvPr id="7" name="文本框 6">
+            <a:extLst>
+              <a:ext uri="{FF2B5EF4-FFF2-40B4-BE49-F238E27FC236}">
+                <a16:creationId xmlns:a16="http://schemas.microsoft.com/office/drawing/2014/main" id="{627349DF-2294-F0CD-C279-622C244ABA48}"/>
               </a:ext>
             </a:extLst>
           </p:cNvPr>
@@ -3529,8 +3578,8 @@
         </p:nvSpPr>
         <p:spPr>
           <a:xfrm>
-            <a:off x="718956" y="5018730"/>
-            <a:ext cx="1484702" cy="369332"/>
+            <a:off x="5534793" y="343699"/>
+            <a:ext cx="6657207" cy="646331"/>
           </a:xfrm>
           <a:prstGeom prst="rect">
             <a:avLst/>
@@ -3544,8 +3593,297 @@
           <a:lstStyle/>
           <a:p>
             <a:r>
+              <a:rPr lang="en-US" dirty="0" err="1"/>
+              <a:t>Dataloader</a:t>
+            </a:r>
+            <a:r>
               <a:rPr lang="en-US" dirty="0"/>
-              <a:t>This is a LSTM</a:t>
+              <a:t> will extract the variable we need</a:t>
+            </a:r>
+          </a:p>
+          <a:p>
+            <a:r>
+              <a:rPr lang="en-US" dirty="0"/>
+              <a:t>Such as embedding or weight for VGG and vocab size for </a:t>
+            </a:r>
+            <a:r>
+              <a:rPr lang="en-US" dirty="0" err="1"/>
+              <a:t>textencoder</a:t>
+            </a:r>
+            <a:endParaRPr lang="en-US" dirty="0"/>
+          </a:p>
+        </p:txBody>
+      </p:sp>
+      <p:sp>
+        <p:nvSpPr>
+          <p:cNvPr id="8" name="文本框 7">
+            <a:extLst>
+              <a:ext uri="{FF2B5EF4-FFF2-40B4-BE49-F238E27FC236}">
+                <a16:creationId xmlns:a16="http://schemas.microsoft.com/office/drawing/2014/main" id="{8BD61603-1285-7388-7076-8B0A8C886DE9}"/>
+              </a:ext>
+            </a:extLst>
+          </p:cNvPr>
+          <p:cNvSpPr txBox="1"/>
+          <p:nvPr/>
+        </p:nvSpPr>
+        <p:spPr>
+          <a:xfrm>
+            <a:off x="7951009" y="1384478"/>
+            <a:ext cx="4434740" cy="1477328"/>
+          </a:xfrm>
+          <a:prstGeom prst="rect">
+            <a:avLst/>
+          </a:prstGeom>
+          <a:noFill/>
+        </p:spPr>
+        <p:txBody>
+          <a:bodyPr wrap="none" rtlCol="0">
+            <a:spAutoFit/>
+          </a:bodyPr>
+          <a:lstStyle/>
+          <a:p>
+            <a:r>
+              <a:rPr lang="en-US" dirty="0"/>
+              <a:t>The </a:t>
+            </a:r>
+            <a:r>
+              <a:rPr lang="en-US" dirty="0" err="1"/>
+              <a:t>BaseLineRNN</a:t>
+            </a:r>
+            <a:r>
+              <a:rPr lang="en-US" dirty="0"/>
+              <a:t> is our model, as the base-</a:t>
+            </a:r>
+          </a:p>
+          <a:p>
+            <a:r>
+              <a:rPr lang="en-US" dirty="0"/>
+              <a:t>-line established, a VGG-16 image encoder a-</a:t>
+            </a:r>
+          </a:p>
+          <a:p>
+            <a:r>
+              <a:rPr lang="en-US" dirty="0"/>
+              <a:t>-</a:t>
+            </a:r>
+            <a:r>
+              <a:rPr lang="en-US" dirty="0" err="1"/>
+              <a:t>nd</a:t>
+            </a:r>
+            <a:r>
+              <a:rPr lang="en-US" dirty="0"/>
+              <a:t> a </a:t>
+            </a:r>
+            <a:r>
+              <a:rPr lang="en-US" dirty="0" err="1"/>
+              <a:t>Textencoder</a:t>
+            </a:r>
+            <a:r>
+              <a:rPr lang="en-US" dirty="0"/>
+              <a:t> will be initiated with the </a:t>
+            </a:r>
+          </a:p>
+          <a:p>
+            <a:r>
+              <a:rPr lang="en-US" dirty="0"/>
+              <a:t>Variable we gather from </a:t>
+            </a:r>
+            <a:r>
+              <a:rPr lang="en-US" dirty="0" err="1"/>
+              <a:t>dataloader</a:t>
+            </a:r>
+            <a:r>
+              <a:rPr lang="en-US" dirty="0"/>
+              <a:t> or design</a:t>
+            </a:r>
+          </a:p>
+          <a:p>
+            <a:r>
+              <a:rPr lang="en-US" dirty="0"/>
+              <a:t>By ourself.</a:t>
+            </a:r>
+          </a:p>
+        </p:txBody>
+      </p:sp>
+      <p:sp>
+        <p:nvSpPr>
+          <p:cNvPr id="9" name="文本框 8">
+            <a:extLst>
+              <a:ext uri="{FF2B5EF4-FFF2-40B4-BE49-F238E27FC236}">
+                <a16:creationId xmlns:a16="http://schemas.microsoft.com/office/drawing/2014/main" id="{08A4EACE-2520-CFF1-1F60-EBCECBB97E01}"/>
+              </a:ext>
+            </a:extLst>
+          </p:cNvPr>
+          <p:cNvSpPr txBox="1"/>
+          <p:nvPr/>
+        </p:nvSpPr>
+        <p:spPr>
+          <a:xfrm>
+            <a:off x="7951009" y="3271234"/>
+            <a:ext cx="4441729" cy="2308324"/>
+          </a:xfrm>
+          <a:prstGeom prst="rect">
+            <a:avLst/>
+          </a:prstGeom>
+          <a:noFill/>
+        </p:spPr>
+        <p:txBody>
+          <a:bodyPr wrap="none" rtlCol="0">
+            <a:spAutoFit/>
+          </a:bodyPr>
+          <a:lstStyle/>
+          <a:p>
+            <a:r>
+              <a:rPr lang="en-US" dirty="0"/>
+              <a:t>When the training start, the LSTM will gather</a:t>
+            </a:r>
+          </a:p>
+          <a:p>
+            <a:r>
+              <a:rPr lang="en-US" dirty="0"/>
+              <a:t>feature from image encoder and </a:t>
+            </a:r>
+            <a:r>
+              <a:rPr lang="en-US" dirty="0" err="1"/>
+              <a:t>h_n</a:t>
+            </a:r>
+            <a:r>
+              <a:rPr lang="en-US" dirty="0"/>
+              <a:t> and </a:t>
+            </a:r>
+            <a:r>
+              <a:rPr lang="en-US" dirty="0" err="1"/>
+              <a:t>c_n</a:t>
+            </a:r>
+            <a:endParaRPr lang="en-US" dirty="0"/>
+          </a:p>
+          <a:p>
+            <a:r>
+              <a:rPr lang="en-US" dirty="0"/>
+              <a:t>generate from torch. Later the LSTM model</a:t>
+            </a:r>
+          </a:p>
+          <a:p>
+            <a:r>
+              <a:rPr lang="en-US" dirty="0"/>
+              <a:t>will generate out result which the </a:t>
+            </a:r>
+            <a:r>
+              <a:rPr lang="en-US" dirty="0" err="1"/>
+              <a:t>textencod</a:t>
+            </a:r>
+            <a:r>
+              <a:rPr lang="en-US" dirty="0"/>
+              <a:t>-</a:t>
+            </a:r>
+          </a:p>
+          <a:p>
+            <a:r>
+              <a:rPr lang="en-US" dirty="0"/>
+              <a:t>-er will gather token and reshaped to the </a:t>
+            </a:r>
+            <a:r>
+              <a:rPr lang="en-US" dirty="0" err="1"/>
+              <a:t>inp</a:t>
+            </a:r>
+            <a:r>
+              <a:rPr lang="en-US" dirty="0"/>
+              <a:t>-</a:t>
+            </a:r>
+          </a:p>
+          <a:p>
+            <a:r>
+              <a:rPr lang="en-US" dirty="0"/>
+              <a:t>-</a:t>
+            </a:r>
+            <a:r>
+              <a:rPr lang="en-US" dirty="0" err="1"/>
+              <a:t>ut</a:t>
+            </a:r>
+            <a:r>
+              <a:rPr lang="en-US" dirty="0"/>
+              <a:t> for next iteration of LSTM, and the next </a:t>
+            </a:r>
+          </a:p>
+          <a:p>
+            <a:r>
+              <a:rPr lang="en-US" dirty="0"/>
+              <a:t>Iteration will received feature from new </a:t>
+            </a:r>
+            <a:r>
+              <a:rPr lang="en-US" dirty="0" err="1"/>
+              <a:t>iter</a:t>
+            </a:r>
+            <a:r>
+              <a:rPr lang="en-US" dirty="0"/>
+              <a:t>-</a:t>
+            </a:r>
+          </a:p>
+          <a:p>
+            <a:r>
+              <a:rPr lang="en-US" dirty="0" err="1"/>
+              <a:t>Ation</a:t>
+            </a:r>
+            <a:r>
+              <a:rPr lang="en-US" dirty="0"/>
+              <a:t> of image encoder as well.</a:t>
+            </a:r>
+          </a:p>
+        </p:txBody>
+      </p:sp>
+      <p:sp>
+        <p:nvSpPr>
+          <p:cNvPr id="10" name="文本框 9">
+            <a:extLst>
+              <a:ext uri="{FF2B5EF4-FFF2-40B4-BE49-F238E27FC236}">
+                <a16:creationId xmlns:a16="http://schemas.microsoft.com/office/drawing/2014/main" id="{653B6E9D-A926-1299-A7D6-D3812F2ADF38}"/>
+              </a:ext>
+            </a:extLst>
+          </p:cNvPr>
+          <p:cNvSpPr txBox="1"/>
+          <p:nvPr/>
+        </p:nvSpPr>
+        <p:spPr>
+          <a:xfrm>
+            <a:off x="7501944" y="5574039"/>
+            <a:ext cx="4868192" cy="646331"/>
+          </a:xfrm>
+          <a:prstGeom prst="rect">
+            <a:avLst/>
+          </a:prstGeom>
+          <a:noFill/>
+        </p:spPr>
+        <p:txBody>
+          <a:bodyPr wrap="none" rtlCol="0">
+            <a:spAutoFit/>
+          </a:bodyPr>
+          <a:lstStyle/>
+          <a:p>
+            <a:r>
+              <a:rPr lang="en-US" dirty="0"/>
+              <a:t>During the iteration, the optimizer and criteria </a:t>
+            </a:r>
+            <a:r>
+              <a:rPr lang="en-US" dirty="0" err="1"/>
+              <a:t>wi</a:t>
+            </a:r>
+            <a:r>
+              <a:rPr lang="en-US" dirty="0"/>
+              <a:t>-</a:t>
+            </a:r>
+          </a:p>
+          <a:p>
+            <a:r>
+              <a:rPr lang="en-US" dirty="0"/>
+              <a:t>-</a:t>
+            </a:r>
+            <a:r>
+              <a:rPr lang="en-US" dirty="0" err="1"/>
+              <a:t>ll</a:t>
+            </a:r>
+            <a:r>
+              <a:rPr lang="en-US" dirty="0"/>
+              <a:t> record the lose for further training.</a:t>
             </a:r>
           </a:p>
         </p:txBody>
@@ -3639,6 +3977,42 @@
           <a:chExt cx="0" cy="0"/>
         </a:xfrm>
       </p:grpSpPr>
+      <p:pic>
+        <p:nvPicPr>
+          <p:cNvPr id="7" name="图片 6" descr="猫在沙发上&#10;&#10;描述已自动生成">
+            <a:extLst>
+              <a:ext uri="{FF2B5EF4-FFF2-40B4-BE49-F238E27FC236}">
+                <a16:creationId xmlns:a16="http://schemas.microsoft.com/office/drawing/2014/main" id="{47E1AFF7-1278-EAEF-8E57-54B4D03F8634}"/>
+              </a:ext>
+            </a:extLst>
+          </p:cNvPr>
+          <p:cNvPicPr>
+            <a:picLocks noChangeAspect="1"/>
+          </p:cNvPicPr>
+          <p:nvPr/>
+        </p:nvPicPr>
+        <p:blipFill>
+          <a:blip r:embed="rId2">
+            <a:extLst>
+              <a:ext uri="{28A0092B-C50C-407E-A947-70E740481C1C}">
+                <a14:useLocalDpi xmlns:a14="http://schemas.microsoft.com/office/drawing/2010/main" val="0"/>
+              </a:ext>
+            </a:extLst>
+          </a:blip>
+          <a:stretch>
+            <a:fillRect/>
+          </a:stretch>
+        </p:blipFill>
+        <p:spPr>
+          <a:xfrm>
+            <a:off x="328411" y="1741320"/>
+            <a:ext cx="3403649" cy="2938306"/>
+          </a:xfrm>
+          <a:prstGeom prst="rect">
+            <a:avLst/>
+          </a:prstGeom>
+        </p:spPr>
+      </p:pic>
       <p:sp>
         <p:nvSpPr>
           <p:cNvPr id="2" name="标题 1">
@@ -3662,34 +4036,160 @@
           <a:p>
             <a:pPr algn="ctr"/>
             <a:r>
+              <a:rPr lang="en-US" b="1" dirty="0"/>
+              <a:t>Lesson Learned so far</a:t>
+            </a:r>
+          </a:p>
+        </p:txBody>
+      </p:sp>
+      <p:sp>
+        <p:nvSpPr>
+          <p:cNvPr id="4" name="文本框 3">
+            <a:extLst>
+              <a:ext uri="{FF2B5EF4-FFF2-40B4-BE49-F238E27FC236}">
+                <a16:creationId xmlns:a16="http://schemas.microsoft.com/office/drawing/2014/main" id="{A9230ED1-7FD2-81F1-012C-B479E4111787}"/>
+              </a:ext>
+            </a:extLst>
+          </p:cNvPr>
+          <p:cNvSpPr txBox="1"/>
+          <p:nvPr/>
+        </p:nvSpPr>
+        <p:spPr>
+          <a:xfrm>
+            <a:off x="328411" y="1860996"/>
+            <a:ext cx="4407553" cy="2031325"/>
+          </a:xfrm>
+          <a:prstGeom prst="rect">
+            <a:avLst/>
+          </a:prstGeom>
+          <a:noFill/>
+        </p:spPr>
+        <p:txBody>
+          <a:bodyPr wrap="none" rtlCol="0">
+            <a:spAutoFit/>
+          </a:bodyPr>
+          <a:lstStyle/>
+          <a:p>
+            <a:r>
+              <a:rPr lang="en-US" dirty="0">
+                <a:solidFill>
+                  <a:srgbClr val="FF0000"/>
+                </a:solidFill>
+              </a:rPr>
+              <a:t>Challenge</a:t>
+            </a:r>
+          </a:p>
+          <a:p>
+            <a:r>
+              <a:rPr lang="en-US" dirty="0">
+                <a:solidFill>
+                  <a:srgbClr val="FF0000"/>
+                </a:solidFill>
+              </a:rPr>
+              <a:t>1: Image Caption is hard</a:t>
+            </a:r>
+          </a:p>
+          <a:p>
+            <a:r>
+              <a:rPr lang="en-US" dirty="0">
+                <a:solidFill>
+                  <a:srgbClr val="FF0000"/>
+                </a:solidFill>
+              </a:rPr>
+              <a:t>2: The time cost for each train is heavy</a:t>
+            </a:r>
+          </a:p>
+          <a:p>
+            <a:r>
+              <a:rPr lang="en-US" dirty="0">
+                <a:solidFill>
+                  <a:srgbClr val="FF0000"/>
+                </a:solidFill>
+              </a:rPr>
+              <a:t>and we have a huge dataset to train and test </a:t>
+            </a:r>
+          </a:p>
+          <a:p>
+            <a:r>
+              <a:rPr lang="en-US" dirty="0">
+                <a:solidFill>
+                  <a:srgbClr val="FF0000"/>
+                </a:solidFill>
+              </a:rPr>
+              <a:t>3</a:t>
+            </a:r>
+          </a:p>
+          <a:p>
+            <a:r>
+              <a:rPr lang="en-US" dirty="0">
+                <a:solidFill>
+                  <a:srgbClr val="FF0000"/>
+                </a:solidFill>
+              </a:rPr>
+              <a:t>4</a:t>
+            </a:r>
+          </a:p>
+          <a:p>
+            <a:endParaRPr lang="en-US" dirty="0"/>
+          </a:p>
+        </p:txBody>
+      </p:sp>
+      <p:sp>
+        <p:nvSpPr>
+          <p:cNvPr id="5" name="文本框 4">
+            <a:extLst>
+              <a:ext uri="{FF2B5EF4-FFF2-40B4-BE49-F238E27FC236}">
+                <a16:creationId xmlns:a16="http://schemas.microsoft.com/office/drawing/2014/main" id="{44D43A35-E143-3268-AA0C-692D517F36D9}"/>
+              </a:ext>
+            </a:extLst>
+          </p:cNvPr>
+          <p:cNvSpPr txBox="1"/>
+          <p:nvPr/>
+        </p:nvSpPr>
+        <p:spPr>
+          <a:xfrm>
+            <a:off x="7638883" y="1860996"/>
+            <a:ext cx="821059" cy="1477328"/>
+          </a:xfrm>
+          <a:prstGeom prst="rect">
+            <a:avLst/>
+          </a:prstGeom>
+          <a:noFill/>
+        </p:spPr>
+        <p:txBody>
+          <a:bodyPr wrap="none" rtlCol="0">
+            <a:spAutoFit/>
+          </a:bodyPr>
+          <a:lstStyle/>
+          <a:p>
+            <a:r>
               <a:rPr lang="en-US" dirty="0"/>
-              <a:t>Lesson Learned so far</a:t>
-            </a:r>
-          </a:p>
-        </p:txBody>
-      </p:sp>
-      <p:sp>
-        <p:nvSpPr>
-          <p:cNvPr id="3" name="内容占位符 2">
-            <a:extLst>
-              <a:ext uri="{FF2B5EF4-FFF2-40B4-BE49-F238E27FC236}">
-                <a16:creationId xmlns:a16="http://schemas.microsoft.com/office/drawing/2014/main" id="{8B75D2E9-3119-9408-C1E1-A947AD28EB8F}"/>
-              </a:ext>
-            </a:extLst>
-          </p:cNvPr>
-          <p:cNvSpPr>
-            <a:spLocks noGrp="1"/>
-          </p:cNvSpPr>
-          <p:nvPr>
-            <p:ph idx="1"/>
-          </p:nvPr>
-        </p:nvSpPr>
-        <p:spPr/>
-        <p:txBody>
-          <a:bodyPr/>
-          <a:lstStyle/>
-          <a:p>
-            <a:endParaRPr lang="en-US"/>
+              <a:t>Lesson</a:t>
+            </a:r>
+          </a:p>
+          <a:p>
+            <a:r>
+              <a:rPr lang="en-US" dirty="0"/>
+              <a:t>1</a:t>
+            </a:r>
+          </a:p>
+          <a:p>
+            <a:r>
+              <a:rPr lang="en-US" dirty="0"/>
+              <a:t>2</a:t>
+            </a:r>
+          </a:p>
+          <a:p>
+            <a:r>
+              <a:rPr lang="en-US" dirty="0"/>
+              <a:t>3</a:t>
+            </a:r>
+          </a:p>
+          <a:p>
+            <a:r>
+              <a:rPr lang="en-US" dirty="0"/>
+              <a:t>4</a:t>
+            </a:r>
           </a:p>
         </p:txBody>
       </p:sp>
@@ -3744,32 +4244,151 @@
           <a:bodyPr/>
           <a:lstStyle/>
           <a:p>
-            <a:endParaRPr lang="en-US"/>
-          </a:p>
-        </p:txBody>
-      </p:sp>
-      <p:sp>
-        <p:nvSpPr>
-          <p:cNvPr id="3" name="内容占位符 2">
-            <a:extLst>
-              <a:ext uri="{FF2B5EF4-FFF2-40B4-BE49-F238E27FC236}">
-                <a16:creationId xmlns:a16="http://schemas.microsoft.com/office/drawing/2014/main" id="{36DC2093-9E17-1B77-E358-5A2479762CDF}"/>
-              </a:ext>
-            </a:extLst>
-          </p:cNvPr>
-          <p:cNvSpPr>
-            <a:spLocks noGrp="1"/>
-          </p:cNvSpPr>
-          <p:nvPr>
-            <p:ph idx="1"/>
-          </p:nvPr>
-        </p:nvSpPr>
-        <p:spPr/>
-        <p:txBody>
-          <a:bodyPr/>
-          <a:lstStyle/>
-          <a:p>
-            <a:endParaRPr lang="en-US"/>
+            <a:pPr algn="ctr"/>
+            <a:r>
+              <a:rPr lang="en-US" b="1" dirty="0"/>
+              <a:t>Conclusion and future</a:t>
+            </a:r>
+          </a:p>
+        </p:txBody>
+      </p:sp>
+      <p:sp>
+        <p:nvSpPr>
+          <p:cNvPr id="4" name="文本框 3">
+            <a:extLst>
+              <a:ext uri="{FF2B5EF4-FFF2-40B4-BE49-F238E27FC236}">
+                <a16:creationId xmlns:a16="http://schemas.microsoft.com/office/drawing/2014/main" id="{65055056-388C-E14B-61B9-F9F0427A1F34}"/>
+              </a:ext>
+            </a:extLst>
+          </p:cNvPr>
+          <p:cNvSpPr txBox="1"/>
+          <p:nvPr/>
+        </p:nvSpPr>
+        <p:spPr>
+          <a:xfrm>
+            <a:off x="1126901" y="3509493"/>
+            <a:ext cx="2902782" cy="523220"/>
+          </a:xfrm>
+          <a:prstGeom prst="rect">
+            <a:avLst/>
+          </a:prstGeom>
+          <a:noFill/>
+        </p:spPr>
+        <p:txBody>
+          <a:bodyPr wrap="none" rtlCol="0">
+            <a:spAutoFit/>
+          </a:bodyPr>
+          <a:lstStyle/>
+          <a:p>
+            <a:r>
+              <a:rPr lang="en-US" sz="2800" b="1" dirty="0"/>
+              <a:t>What we do next?</a:t>
+            </a:r>
+          </a:p>
+        </p:txBody>
+      </p:sp>
+      <p:sp>
+        <p:nvSpPr>
+          <p:cNvPr id="5" name="文本框 4">
+            <a:extLst>
+              <a:ext uri="{FF2B5EF4-FFF2-40B4-BE49-F238E27FC236}">
+                <a16:creationId xmlns:a16="http://schemas.microsoft.com/office/drawing/2014/main" id="{27412729-A053-74A9-7E54-AFD9A10D8E2A}"/>
+              </a:ext>
+            </a:extLst>
+          </p:cNvPr>
+          <p:cNvSpPr txBox="1"/>
+          <p:nvPr/>
+        </p:nvSpPr>
+        <p:spPr>
+          <a:xfrm>
+            <a:off x="1126901" y="4378817"/>
+            <a:ext cx="9920344" cy="369332"/>
+          </a:xfrm>
+          <a:prstGeom prst="rect">
+            <a:avLst/>
+          </a:prstGeom>
+          <a:noFill/>
+        </p:spPr>
+        <p:txBody>
+          <a:bodyPr wrap="none" rtlCol="0">
+            <a:spAutoFit/>
+          </a:bodyPr>
+          <a:lstStyle/>
+          <a:p>
+            <a:r>
+              <a:rPr lang="en-US" dirty="0"/>
+              <a:t>As the base structure goes to stable, we will introduce new dataset (COCO) to increase our performance</a:t>
+            </a:r>
+          </a:p>
+        </p:txBody>
+      </p:sp>
+      <p:sp>
+        <p:nvSpPr>
+          <p:cNvPr id="6" name="文本框 5">
+            <a:extLst>
+              <a:ext uri="{FF2B5EF4-FFF2-40B4-BE49-F238E27FC236}">
+                <a16:creationId xmlns:a16="http://schemas.microsoft.com/office/drawing/2014/main" id="{B977A7DC-BA70-0585-F0F6-FAC38F9143B2}"/>
+              </a:ext>
+            </a:extLst>
+          </p:cNvPr>
+          <p:cNvSpPr txBox="1"/>
+          <p:nvPr/>
+        </p:nvSpPr>
+        <p:spPr>
+          <a:xfrm>
+            <a:off x="1126901" y="5094253"/>
+            <a:ext cx="6602833" cy="369332"/>
+          </a:xfrm>
+          <a:prstGeom prst="rect">
+            <a:avLst/>
+          </a:prstGeom>
+          <a:noFill/>
+        </p:spPr>
+        <p:txBody>
+          <a:bodyPr wrap="none" rtlCol="0">
+            <a:spAutoFit/>
+          </a:bodyPr>
+          <a:lstStyle/>
+          <a:p>
+            <a:r>
+              <a:rPr lang="en-US" dirty="0"/>
+              <a:t>New module such as attention module will be put into consideration.</a:t>
+            </a:r>
+          </a:p>
+        </p:txBody>
+      </p:sp>
+      <p:sp>
+        <p:nvSpPr>
+          <p:cNvPr id="7" name="文本框 6">
+            <a:extLst>
+              <a:ext uri="{FF2B5EF4-FFF2-40B4-BE49-F238E27FC236}">
+                <a16:creationId xmlns:a16="http://schemas.microsoft.com/office/drawing/2014/main" id="{957706B0-80C9-08EA-66C3-CEFF2109FABE}"/>
+              </a:ext>
+            </a:extLst>
+          </p:cNvPr>
+          <p:cNvSpPr txBox="1"/>
+          <p:nvPr/>
+        </p:nvSpPr>
+        <p:spPr>
+          <a:xfrm>
+            <a:off x="1126901" y="1513572"/>
+            <a:ext cx="3174843" cy="523220"/>
+          </a:xfrm>
+          <a:prstGeom prst="rect">
+            <a:avLst/>
+          </a:prstGeom>
+          <a:noFill/>
+        </p:spPr>
+        <p:txBody>
+          <a:bodyPr wrap="none" rtlCol="0">
+            <a:spAutoFit/>
+          </a:bodyPr>
+          <a:lstStyle/>
+          <a:p>
+            <a:r>
+              <a:rPr lang="en-US" sz="2800" b="1" dirty="0"/>
+              <a:t>What we got so far?</a:t>
+            </a:r>
           </a:p>
         </p:txBody>
       </p:sp>

</xml_diff>